<commit_message>
This closes #4 and #5
</commit_message>
<xml_diff>
--- a/Architecture.pptx
+++ b/Architecture.pptx
@@ -243,7 +243,7 @@
           <a:p>
             <a:fld id="{53C019E8-4B05-4A45-96FE-72605DB0A483}" type="datetimeFigureOut">
               <a:rPr lang="pt-BR" smtClean="0"/>
-              <a:t>07/10/2019</a:t>
+              <a:t>09/10/2019</a:t>
             </a:fld>
             <a:endParaRPr lang="pt-BR"/>
           </a:p>
@@ -413,7 +413,7 @@
           <a:p>
             <a:fld id="{53C019E8-4B05-4A45-96FE-72605DB0A483}" type="datetimeFigureOut">
               <a:rPr lang="pt-BR" smtClean="0"/>
-              <a:t>07/10/2019</a:t>
+              <a:t>09/10/2019</a:t>
             </a:fld>
             <a:endParaRPr lang="pt-BR"/>
           </a:p>
@@ -593,7 +593,7 @@
           <a:p>
             <a:fld id="{53C019E8-4B05-4A45-96FE-72605DB0A483}" type="datetimeFigureOut">
               <a:rPr lang="pt-BR" smtClean="0"/>
-              <a:t>07/10/2019</a:t>
+              <a:t>09/10/2019</a:t>
             </a:fld>
             <a:endParaRPr lang="pt-BR"/>
           </a:p>
@@ -763,7 +763,7 @@
           <a:p>
             <a:fld id="{53C019E8-4B05-4A45-96FE-72605DB0A483}" type="datetimeFigureOut">
               <a:rPr lang="pt-BR" smtClean="0"/>
-              <a:t>07/10/2019</a:t>
+              <a:t>09/10/2019</a:t>
             </a:fld>
             <a:endParaRPr lang="pt-BR"/>
           </a:p>
@@ -1009,7 +1009,7 @@
           <a:p>
             <a:fld id="{53C019E8-4B05-4A45-96FE-72605DB0A483}" type="datetimeFigureOut">
               <a:rPr lang="pt-BR" smtClean="0"/>
-              <a:t>07/10/2019</a:t>
+              <a:t>09/10/2019</a:t>
             </a:fld>
             <a:endParaRPr lang="pt-BR"/>
           </a:p>
@@ -1241,7 +1241,7 @@
           <a:p>
             <a:fld id="{53C019E8-4B05-4A45-96FE-72605DB0A483}" type="datetimeFigureOut">
               <a:rPr lang="pt-BR" smtClean="0"/>
-              <a:t>07/10/2019</a:t>
+              <a:t>09/10/2019</a:t>
             </a:fld>
             <a:endParaRPr lang="pt-BR"/>
           </a:p>
@@ -1608,7 +1608,7 @@
           <a:p>
             <a:fld id="{53C019E8-4B05-4A45-96FE-72605DB0A483}" type="datetimeFigureOut">
               <a:rPr lang="pt-BR" smtClean="0"/>
-              <a:t>07/10/2019</a:t>
+              <a:t>09/10/2019</a:t>
             </a:fld>
             <a:endParaRPr lang="pt-BR"/>
           </a:p>
@@ -1726,7 +1726,7 @@
           <a:p>
             <a:fld id="{53C019E8-4B05-4A45-96FE-72605DB0A483}" type="datetimeFigureOut">
               <a:rPr lang="pt-BR" smtClean="0"/>
-              <a:t>07/10/2019</a:t>
+              <a:t>09/10/2019</a:t>
             </a:fld>
             <a:endParaRPr lang="pt-BR"/>
           </a:p>
@@ -1821,7 +1821,7 @@
           <a:p>
             <a:fld id="{53C019E8-4B05-4A45-96FE-72605DB0A483}" type="datetimeFigureOut">
               <a:rPr lang="pt-BR" smtClean="0"/>
-              <a:t>07/10/2019</a:t>
+              <a:t>09/10/2019</a:t>
             </a:fld>
             <a:endParaRPr lang="pt-BR"/>
           </a:p>
@@ -2098,7 +2098,7 @@
           <a:p>
             <a:fld id="{53C019E8-4B05-4A45-96FE-72605DB0A483}" type="datetimeFigureOut">
               <a:rPr lang="pt-BR" smtClean="0"/>
-              <a:t>07/10/2019</a:t>
+              <a:t>09/10/2019</a:t>
             </a:fld>
             <a:endParaRPr lang="pt-BR"/>
           </a:p>
@@ -2351,7 +2351,7 @@
           <a:p>
             <a:fld id="{53C019E8-4B05-4A45-96FE-72605DB0A483}" type="datetimeFigureOut">
               <a:rPr lang="pt-BR" smtClean="0"/>
-              <a:t>07/10/2019</a:t>
+              <a:t>09/10/2019</a:t>
             </a:fld>
             <a:endParaRPr lang="pt-BR"/>
           </a:p>
@@ -2564,7 +2564,7 @@
           <a:p>
             <a:fld id="{53C019E8-4B05-4A45-96FE-72605DB0A483}" type="datetimeFigureOut">
               <a:rPr lang="pt-BR" smtClean="0"/>
-              <a:t>07/10/2019</a:t>
+              <a:t>09/10/2019</a:t>
             </a:fld>
             <a:endParaRPr lang="pt-BR"/>
           </a:p>
@@ -2983,7 +2983,7 @@
         </p:nvSpPr>
         <p:spPr>
           <a:xfrm>
-            <a:off x="1570471" y="1734069"/>
+            <a:off x="2269719" y="1734069"/>
             <a:ext cx="7268622" cy="2651861"/>
           </a:xfrm>
           <a:prstGeom prst="rect">
@@ -3082,7 +3082,7 @@
         </p:blipFill>
         <p:spPr>
           <a:xfrm>
-            <a:off x="1570471" y="1734069"/>
+            <a:off x="2269719" y="1734069"/>
             <a:ext cx="498491" cy="498491"/>
           </a:xfrm>
           <a:prstGeom prst="rect">
@@ -3098,7 +3098,7 @@
         </p:nvGrpSpPr>
         <p:grpSpPr>
           <a:xfrm>
-            <a:off x="7147682" y="2669176"/>
+            <a:off x="7846930" y="2669176"/>
             <a:ext cx="1691411" cy="1018977"/>
             <a:chOff x="9417187" y="1107881"/>
             <a:chExt cx="1691411" cy="1018977"/>
@@ -3200,7 +3200,7 @@
         </p:nvGrpSpPr>
         <p:grpSpPr>
           <a:xfrm>
-            <a:off x="1570471" y="2176898"/>
+            <a:off x="2269719" y="2176898"/>
             <a:ext cx="1691411" cy="1446300"/>
             <a:chOff x="247557" y="2251604"/>
             <a:chExt cx="1691411" cy="1446300"/>
@@ -3332,7 +3332,7 @@
         </p:nvGrpSpPr>
         <p:grpSpPr>
           <a:xfrm>
-            <a:off x="4395355" y="2669176"/>
+            <a:off x="5094603" y="2669176"/>
             <a:ext cx="1123121" cy="835437"/>
             <a:chOff x="2322745" y="2618241"/>
             <a:chExt cx="1123121" cy="835437"/>
@@ -3436,7 +3436,7 @@
         </p:nvSpPr>
         <p:spPr>
           <a:xfrm>
-            <a:off x="123674" y="2798272"/>
+            <a:off x="822922" y="2798272"/>
             <a:ext cx="1386060" cy="523220"/>
           </a:xfrm>
           <a:prstGeom prst="rect">
@@ -3475,7 +3475,7 @@
         </p:nvCxnSpPr>
         <p:spPr>
           <a:xfrm>
-            <a:off x="1259999" y="3060000"/>
+            <a:off x="1959247" y="3060000"/>
             <a:ext cx="1260000" cy="0"/>
           </a:xfrm>
           <a:prstGeom prst="straightConnector1">
@@ -3518,7 +3518,7 @@
         </p:nvSpPr>
         <p:spPr>
           <a:xfrm>
-            <a:off x="2653934" y="2784006"/>
+            <a:off x="3353182" y="2784006"/>
             <a:ext cx="1996583" cy="276999"/>
           </a:xfrm>
           <a:prstGeom prst="rect">
@@ -3557,7 +3557,7 @@
         </p:nvCxnSpPr>
         <p:spPr>
           <a:xfrm>
-            <a:off x="3009206" y="3060416"/>
+            <a:off x="3708454" y="3060416"/>
             <a:ext cx="1260000" cy="0"/>
           </a:xfrm>
           <a:prstGeom prst="straightConnector1">
@@ -3600,7 +3600,7 @@
         </p:nvSpPr>
         <p:spPr>
           <a:xfrm>
-            <a:off x="5305270" y="2783001"/>
+            <a:off x="6004518" y="2783001"/>
             <a:ext cx="1996583" cy="276999"/>
           </a:xfrm>
           <a:prstGeom prst="rect">
@@ -3639,7 +3639,7 @@
         </p:nvCxnSpPr>
         <p:spPr>
           <a:xfrm>
-            <a:off x="5588824" y="3060416"/>
+            <a:off x="6288072" y="3060416"/>
             <a:ext cx="1440000" cy="0"/>
           </a:xfrm>
           <a:prstGeom prst="straightConnector1">
@@ -3682,7 +3682,7 @@
         </p:nvSpPr>
         <p:spPr>
           <a:xfrm>
-            <a:off x="5305269" y="3069974"/>
+            <a:off x="6004517" y="3069974"/>
             <a:ext cx="1996583" cy="276999"/>
           </a:xfrm>
           <a:prstGeom prst="rect">
@@ -3727,7 +3727,7 @@
         </p:blipFill>
         <p:spPr>
           <a:xfrm>
-            <a:off x="5700410" y="2102619"/>
+            <a:off x="6399658" y="2102619"/>
             <a:ext cx="1438836" cy="839321"/>
           </a:xfrm>
           <a:prstGeom prst="rect">
@@ -3735,116 +3735,6 @@
           </a:prstGeom>
         </p:spPr>
       </p:pic>
-      <p:grpSp>
-        <p:nvGrpSpPr>
-          <p:cNvPr id="13" name="Agrupar 12"/>
-          <p:cNvGrpSpPr/>
-          <p:nvPr/>
-        </p:nvGrpSpPr>
-        <p:grpSpPr>
-          <a:xfrm>
-            <a:off x="9128698" y="2678949"/>
-            <a:ext cx="1691411" cy="1221977"/>
-            <a:chOff x="9800303" y="2668760"/>
-            <a:chExt cx="1691411" cy="1221977"/>
-          </a:xfrm>
-        </p:grpSpPr>
-        <p:pic>
-          <p:nvPicPr>
-            <p:cNvPr id="12" name="Imagem 11"/>
-            <p:cNvPicPr>
-              <a:picLocks noChangeAspect="1"/>
-            </p:cNvPicPr>
-            <p:nvPr/>
-          </p:nvPicPr>
-          <p:blipFill>
-            <a:blip r:embed="rId30" cstate="print">
-              <a:extLst>
-                <a:ext uri="{28A0092B-C50C-407E-A947-70E740481C1C}">
-                  <a14:useLocalDpi xmlns:a14="http://schemas.microsoft.com/office/drawing/2010/main" val="0"/>
-                </a:ext>
-              </a:extLst>
-            </a:blip>
-            <a:stretch>
-              <a:fillRect/>
-            </a:stretch>
-          </p:blipFill>
-          <p:spPr>
-            <a:xfrm>
-              <a:off x="10295793" y="2668760"/>
-              <a:ext cx="700433" cy="698757"/>
-            </a:xfrm>
-            <a:prstGeom prst="rect">
-              <a:avLst/>
-            </a:prstGeom>
-          </p:spPr>
-        </p:pic>
-        <p:sp>
-          <p:nvSpPr>
-            <p:cNvPr id="115" name="TextBox 30">
-              <a:extLst>
-                <a:ext uri="{FF2B5EF4-FFF2-40B4-BE49-F238E27FC236}">
-                  <a16:creationId xmlns:a16="http://schemas.microsoft.com/office/drawing/2014/main" id="{6414C45D-9506-C049-BD9F-8F139B922F64}"/>
-                </a:ext>
-              </a:extLst>
-            </p:cNvPr>
-            <p:cNvSpPr txBox="1"/>
-            <p:nvPr/>
-          </p:nvSpPr>
-          <p:spPr>
-            <a:xfrm>
-              <a:off x="9800303" y="3367517"/>
-              <a:ext cx="1691411" cy="523220"/>
-            </a:xfrm>
-            <a:prstGeom prst="rect">
-              <a:avLst/>
-            </a:prstGeom>
-            <a:noFill/>
-          </p:spPr>
-          <p:txBody>
-            <a:bodyPr wrap="square" rtlCol="0">
-              <a:spAutoFit/>
-            </a:bodyPr>
-            <a:lstStyle/>
-            <a:p>
-              <a:pPr algn="ctr"/>
-              <a:r>
-                <a:rPr lang="en-US" sz="1400" dirty="0" smtClean="0">
-                  <a:solidFill>
-                    <a:srgbClr val="000000"/>
-                  </a:solidFill>
-                  <a:latin typeface="Arial" panose="020B0604020202020204"/>
-                  <a:ea typeface="Amazon Ember" panose="020B0603020204020204" pitchFamily="34" charset="0"/>
-                  <a:cs typeface="Amazon Ember" panose="020B0603020204020204" pitchFamily="34" charset="0"/>
-                </a:rPr>
-                <a:t>Power BI</a:t>
-              </a:r>
-            </a:p>
-            <a:p>
-              <a:pPr algn="ctr"/>
-              <a:r>
-                <a:rPr lang="en-US" sz="1400" dirty="0" smtClean="0">
-                  <a:solidFill>
-                    <a:srgbClr val="000000"/>
-                  </a:solidFill>
-                  <a:latin typeface="Arial" panose="020B0604020202020204"/>
-                  <a:ea typeface="Amazon Ember" panose="020B0603020204020204" pitchFamily="34" charset="0"/>
-                  <a:cs typeface="Amazon Ember" panose="020B0603020204020204" pitchFamily="34" charset="0"/>
-                </a:rPr>
-                <a:t>Dashboards</a:t>
-              </a:r>
-              <a:endParaRPr lang="en-US" sz="1400" dirty="0">
-                <a:solidFill>
-                  <a:srgbClr val="232F3D"/>
-                </a:solidFill>
-                <a:latin typeface="Arial" panose="020B0604020202020204"/>
-                <a:ea typeface="Amazon Ember" panose="020B0603020204020204" pitchFamily="34" charset="0"/>
-                <a:cs typeface="Amazon Ember" panose="020B0603020204020204" pitchFamily="34" charset="0"/>
-              </a:endParaRPr>
-            </a:p>
-          </p:txBody>
-        </p:sp>
-      </p:grpSp>
       <p:cxnSp>
         <p:nvCxnSpPr>
           <p:cNvPr id="125" name="Straight Arrow Connector 18">
@@ -3861,7 +3751,7 @@
         </p:nvCxnSpPr>
         <p:spPr>
           <a:xfrm>
-            <a:off x="8459309" y="3060000"/>
+            <a:off x="9158557" y="3060000"/>
             <a:ext cx="1046655" cy="0"/>
           </a:xfrm>
           <a:prstGeom prst="straightConnector1">
@@ -3898,7 +3788,7 @@
         </p:nvGrpSpPr>
         <p:grpSpPr>
           <a:xfrm>
-            <a:off x="10622472" y="2781180"/>
+            <a:off x="9811383" y="2644226"/>
             <a:ext cx="1506552" cy="831311"/>
             <a:chOff x="10242950" y="4913508"/>
             <a:chExt cx="1506552" cy="831311"/>
@@ -3919,7 +3809,7 @@
             <p:nvPr/>
           </p:nvPicPr>
           <p:blipFill>
-            <a:blip r:embed="rId31">
+            <a:blip r:embed="rId30">
               <a:extLst>
                 <a:ext uri="{96DAC541-7B7A-43D3-8B79-37D633B846F1}">
                   <asvg:svgBlip xmlns:asvg="http://schemas.microsoft.com/office/drawing/2016/SVG/main" xmlns="" r:embed="rId5"/>
@@ -3997,51 +3887,154 @@
           </p:txBody>
         </p:sp>
       </p:grpSp>
-      <p:cxnSp>
-        <p:nvCxnSpPr>
-          <p:cNvPr id="133" name="Straight Arrow Connector 18">
+      <p:sp>
+        <p:nvSpPr>
+          <p:cNvPr id="30" name="Rectangle 50">
             <a:extLst>
               <a:ext uri="{FF2B5EF4-FFF2-40B4-BE49-F238E27FC236}">
-                <a16:creationId xmlns:a16="http://schemas.microsoft.com/office/drawing/2014/main" id="{C1391436-33C4-4E4D-9260-8B83E0DABA58}"/>
+                <a16:creationId xmlns:a16="http://schemas.microsoft.com/office/drawing/2014/main" id="{7B1A2878-C5FE-3641-84A1-AF1A9456DE01}"/>
               </a:ext>
             </a:extLst>
           </p:cNvPr>
-          <p:cNvCxnSpPr>
-            <a:cxnSpLocks/>
-          </p:cNvCxnSpPr>
+          <p:cNvSpPr/>
           <p:nvPr/>
-        </p:nvCxnSpPr>
+        </p:nvSpPr>
         <p:spPr>
           <a:xfrm>
-            <a:off x="10491648" y="3061009"/>
-            <a:ext cx="540000" cy="0"/>
+            <a:off x="852369" y="1288398"/>
+            <a:ext cx="5380262" cy="3542968"/>
           </a:xfrm>
-          <a:prstGeom prst="straightConnector1">
+          <a:prstGeom prst="rect">
             <a:avLst/>
           </a:prstGeom>
+          <a:noFill/>
           <a:ln w="12700">
             <a:solidFill>
-              <a:schemeClr val="tx2"/>
+              <a:srgbClr val="5A6B86"/>
             </a:solidFill>
-            <a:headEnd type="none" w="med" len="sm"/>
-            <a:tailEnd type="arrow" w="med" len="sm"/>
+            <a:prstDash val="dash"/>
           </a:ln>
         </p:spPr>
         <p:style>
-          <a:lnRef idx="1">
-            <a:schemeClr val="accent1"/>
+          <a:lnRef idx="2">
+            <a:schemeClr val="accent1">
+              <a:shade val="50000"/>
+            </a:schemeClr>
           </a:lnRef>
-          <a:fillRef idx="0">
+          <a:fillRef idx="1">
             <a:schemeClr val="accent1"/>
           </a:fillRef>
           <a:effectRef idx="0">
             <a:schemeClr val="accent1"/>
           </a:effectRef>
           <a:fontRef idx="minor">
-            <a:schemeClr val="tx1"/>
+            <a:schemeClr val="lt1"/>
           </a:fontRef>
         </p:style>
-      </p:cxnSp>
+        <p:txBody>
+          <a:bodyPr rot="0" spcFirstLastPara="0" vertOverflow="overflow" horzOverflow="overflow" vert="horz" wrap="square" lIns="91440" tIns="91440" rIns="91440" bIns="45720" numCol="1" spcCol="0" rtlCol="0" fromWordArt="0" anchor="t" anchorCtr="0" forceAA="0" compatLnSpc="1">
+            <a:prstTxWarp prst="textNoShape">
+              <a:avLst/>
+            </a:prstTxWarp>
+            <a:noAutofit/>
+          </a:bodyPr>
+          <a:lstStyle/>
+          <a:p>
+            <a:pPr algn="ctr"/>
+            <a:r>
+              <a:rPr lang="en-US" sz="1000" dirty="0" smtClean="0">
+                <a:solidFill>
+                  <a:schemeClr val="tx1"/>
+                </a:solidFill>
+                <a:latin typeface="Arial" panose="020B0604020202020204" pitchFamily="34" charset="0"/>
+                <a:cs typeface="Arial" panose="020B0604020202020204" pitchFamily="34" charset="0"/>
+              </a:rPr>
+              <a:t>STAGE I</a:t>
+            </a:r>
+            <a:endParaRPr lang="en-US" sz="1000" dirty="0">
+              <a:solidFill>
+                <a:schemeClr val="tx1"/>
+              </a:solidFill>
+              <a:latin typeface="Arial" panose="020B0604020202020204" pitchFamily="34" charset="0"/>
+              <a:cs typeface="Arial" panose="020B0604020202020204" pitchFamily="34" charset="0"/>
+            </a:endParaRPr>
+          </a:p>
+        </p:txBody>
+      </p:sp>
+      <p:sp>
+        <p:nvSpPr>
+          <p:cNvPr id="31" name="Rectangle 50">
+            <a:extLst>
+              <a:ext uri="{FF2B5EF4-FFF2-40B4-BE49-F238E27FC236}">
+                <a16:creationId xmlns:a16="http://schemas.microsoft.com/office/drawing/2014/main" id="{7B1A2878-C5FE-3641-84A1-AF1A9456DE01}"/>
+              </a:ext>
+            </a:extLst>
+          </p:cNvPr>
+          <p:cNvSpPr/>
+          <p:nvPr/>
+        </p:nvSpPr>
+        <p:spPr>
+          <a:xfrm>
+            <a:off x="5182551" y="1298490"/>
+            <a:ext cx="5906791" cy="3542968"/>
+          </a:xfrm>
+          <a:prstGeom prst="rect">
+            <a:avLst/>
+          </a:prstGeom>
+          <a:noFill/>
+          <a:ln w="12700">
+            <a:solidFill>
+              <a:srgbClr val="5A6B86"/>
+            </a:solidFill>
+            <a:prstDash val="dash"/>
+          </a:ln>
+        </p:spPr>
+        <p:style>
+          <a:lnRef idx="2">
+            <a:schemeClr val="accent1">
+              <a:shade val="50000"/>
+            </a:schemeClr>
+          </a:lnRef>
+          <a:fillRef idx="1">
+            <a:schemeClr val="accent1"/>
+          </a:fillRef>
+          <a:effectRef idx="0">
+            <a:schemeClr val="accent1"/>
+          </a:effectRef>
+          <a:fontRef idx="minor">
+            <a:schemeClr val="lt1"/>
+          </a:fontRef>
+        </p:style>
+        <p:txBody>
+          <a:bodyPr rot="0" spcFirstLastPara="0" vertOverflow="overflow" horzOverflow="overflow" vert="horz" wrap="square" lIns="91440" tIns="91440" rIns="91440" bIns="45720" numCol="1" spcCol="0" rtlCol="0" fromWordArt="0" anchor="t" anchorCtr="0" forceAA="0" compatLnSpc="1">
+            <a:prstTxWarp prst="textNoShape">
+              <a:avLst/>
+            </a:prstTxWarp>
+            <a:noAutofit/>
+          </a:bodyPr>
+          <a:lstStyle/>
+          <a:p>
+            <a:pPr algn="ctr"/>
+            <a:r>
+              <a:rPr lang="en-US" sz="1000" dirty="0" smtClean="0">
+                <a:solidFill>
+                  <a:schemeClr val="tx1"/>
+                </a:solidFill>
+                <a:latin typeface="Arial" panose="020B0604020202020204" pitchFamily="34" charset="0"/>
+                <a:cs typeface="Arial" panose="020B0604020202020204" pitchFamily="34" charset="0"/>
+              </a:rPr>
+              <a:t>STAGE II</a:t>
+            </a:r>
+            <a:endParaRPr lang="en-US" sz="1000" dirty="0">
+              <a:solidFill>
+                <a:schemeClr val="tx1"/>
+              </a:solidFill>
+              <a:latin typeface="Arial" panose="020B0604020202020204" pitchFamily="34" charset="0"/>
+              <a:cs typeface="Arial" panose="020B0604020202020204" pitchFamily="34" charset="0"/>
+            </a:endParaRPr>
+          </a:p>
+        </p:txBody>
+      </p:sp>
     </p:spTree>
     <p:extLst>
       <p:ext uri="{BB962C8B-B14F-4D97-AF65-F5344CB8AC3E}">

</xml_diff>